<commit_message>
updating PPT and optimization notebook
</commit_message>
<xml_diff>
--- a/CARDIOVASCULAR DISEASE PPT.pptx
+++ b/CARDIOVASCULAR DISEASE PPT.pptx
@@ -317,14 +317,6 @@
           <ac:picMkLst>
             <pc:docMk/>
             <pc:sldMk cId="4135607588" sldId="258"/>
-            <ac:picMk id="31" creationId="{4103CAF1-B45A-AFBD-DF21-71D95CB77C0E}"/>
-          </ac:picMkLst>
-        </pc:picChg>
-        <pc:picChg chg="add mod">
-          <ac:chgData name="Ethan Devey" userId="5f935918-78a9-4be5-bdf3-07d15d68beb4" providerId="ADAL" clId="{D5EDF81E-1ED5-400E-8A03-5BFE3C8665DC}" dt="2024-11-27T03:21:08.865" v="937" actId="164"/>
-          <ac:picMkLst>
-            <pc:docMk/>
-            <pc:sldMk cId="4135607588" sldId="258"/>
             <ac:picMk id="33" creationId="{FE64EFB0-8DF4-6FC1-F1CB-017BE5F9447B}"/>
           </ac:picMkLst>
         </pc:picChg>
@@ -348,8 +340,8 @@
   </pc:docChgLst>
   <pc:docChgLst>
     <pc:chgData name="Ioana Platon" userId="18b0f7fbbefdf8fb" providerId="LiveId" clId="{6B6C7C21-72C1-4DCE-B4B2-96DAAA8015BD}"/>
-    <pc:docChg chg="modSld">
-      <pc:chgData name="Ioana Platon" userId="18b0f7fbbefdf8fb" providerId="LiveId" clId="{6B6C7C21-72C1-4DCE-B4B2-96DAAA8015BD}" dt="2024-12-03T02:49:17.920" v="4" actId="20577"/>
+    <pc:docChg chg="undo custSel modSld">
+      <pc:chgData name="Ioana Platon" userId="18b0f7fbbefdf8fb" providerId="LiveId" clId="{6B6C7C21-72C1-4DCE-B4B2-96DAAA8015BD}" dt="2024-12-04T03:08:17.570" v="22" actId="14100"/>
       <pc:docMkLst>
         <pc:docMk/>
       </pc:docMkLst>
@@ -367,6 +359,37 @@
             <ac:spMk id="3" creationId="{F99F89D9-1142-5864-A333-F81CF31C578E}"/>
           </ac:spMkLst>
         </pc:spChg>
+      </pc:sldChg>
+      <pc:sldChg chg="addSp delSp modSp mod modNotesTx">
+        <pc:chgData name="Ioana Platon" userId="18b0f7fbbefdf8fb" providerId="LiveId" clId="{6B6C7C21-72C1-4DCE-B4B2-96DAAA8015BD}" dt="2024-12-04T03:08:17.570" v="22" actId="14100"/>
+        <pc:sldMkLst>
+          <pc:docMk/>
+          <pc:sldMk cId="4135607588" sldId="258"/>
+        </pc:sldMkLst>
+        <pc:spChg chg="mod">
+          <ac:chgData name="Ioana Platon" userId="18b0f7fbbefdf8fb" providerId="LiveId" clId="{6B6C7C21-72C1-4DCE-B4B2-96DAAA8015BD}" dt="2024-12-04T02:57:00.068" v="14" actId="20577"/>
+          <ac:spMkLst>
+            <pc:docMk/>
+            <pc:sldMk cId="4135607588" sldId="258"/>
+            <ac:spMk id="11" creationId="{A0603632-C6AA-ED46-0BF3-31027B0CEFDE}"/>
+          </ac:spMkLst>
+        </pc:spChg>
+        <pc:picChg chg="add mod">
+          <ac:chgData name="Ioana Platon" userId="18b0f7fbbefdf8fb" providerId="LiveId" clId="{6B6C7C21-72C1-4DCE-B4B2-96DAAA8015BD}" dt="2024-12-04T03:08:17.570" v="22" actId="14100"/>
+          <ac:picMkLst>
+            <pc:docMk/>
+            <pc:sldMk cId="4135607588" sldId="258"/>
+            <ac:picMk id="6" creationId="{9A603B3E-685A-F2E1-50A7-214CFE1FA767}"/>
+          </ac:picMkLst>
+        </pc:picChg>
+        <pc:picChg chg="del">
+          <ac:chgData name="Ioana Platon" userId="18b0f7fbbefdf8fb" providerId="LiveId" clId="{6B6C7C21-72C1-4DCE-B4B2-96DAAA8015BD}" dt="2024-12-04T03:05:12.363" v="16" actId="478"/>
+          <ac:picMkLst>
+            <pc:docMk/>
+            <pc:sldMk cId="4135607588" sldId="258"/>
+            <ac:picMk id="31" creationId="{4103CAF1-B45A-AFBD-DF21-71D95CB77C0E}"/>
+          </ac:picMkLst>
+        </pc:picChg>
       </pc:sldChg>
     </pc:docChg>
   </pc:docChgLst>
@@ -455,7 +478,7 @@
           <a:p>
             <a:fld id="{42A13FCA-6DE5-440A-98E3-95AFDAC56FE7}" type="datetimeFigureOut">
               <a:rPr lang="en-US" smtClean="0"/>
-              <a:t>12/2/2024</a:t>
+              <a:t>12/3/2024</a:t>
             </a:fld>
             <a:endParaRPr lang="en-US"/>
           </a:p>
@@ -859,6 +882,9 @@
             </a:r>
           </a:p>
           <a:p>
+            <a:endParaRPr lang="en-US" dirty="0"/>
+          </a:p>
+          <a:p>
             <a:pPr>
               <a:lnSpc>
                 <a:spcPts val="1425"/>
@@ -1192,7 +1218,7 @@
           <a:p>
             <a:fld id="{1C8322F6-1C60-46CF-968C-BC20E470F443}" type="datetimeFigureOut">
               <a:rPr lang="en-US" smtClean="0"/>
-              <a:t>12/2/2024</a:t>
+              <a:t>12/3/2024</a:t>
             </a:fld>
             <a:endParaRPr lang="en-US"/>
           </a:p>
@@ -1526,7 +1552,7 @@
           <a:p>
             <a:fld id="{1C8322F6-1C60-46CF-968C-BC20E470F443}" type="datetimeFigureOut">
               <a:rPr lang="en-US" smtClean="0"/>
-              <a:t>12/2/2024</a:t>
+              <a:t>12/3/2024</a:t>
             </a:fld>
             <a:endParaRPr lang="en-US"/>
           </a:p>
@@ -1779,7 +1805,7 @@
           <a:p>
             <a:fld id="{1C8322F6-1C60-46CF-968C-BC20E470F443}" type="datetimeFigureOut">
               <a:rPr lang="en-US" smtClean="0"/>
-              <a:t>12/2/2024</a:t>
+              <a:t>12/3/2024</a:t>
             </a:fld>
             <a:endParaRPr lang="en-US"/>
           </a:p>
@@ -2113,7 +2139,7 @@
           <a:p>
             <a:fld id="{1C8322F6-1C60-46CF-968C-BC20E470F443}" type="datetimeFigureOut">
               <a:rPr lang="en-US" smtClean="0"/>
-              <a:t>12/2/2024</a:t>
+              <a:t>12/3/2024</a:t>
             </a:fld>
             <a:endParaRPr lang="en-US"/>
           </a:p>
@@ -2394,7 +2420,7 @@
           <a:p>
             <a:fld id="{1C8322F6-1C60-46CF-968C-BC20E470F443}" type="datetimeFigureOut">
               <a:rPr lang="en-US" smtClean="0"/>
-              <a:t>12/2/2024</a:t>
+              <a:t>12/3/2024</a:t>
             </a:fld>
             <a:endParaRPr lang="en-US"/>
           </a:p>
@@ -2796,7 +2822,7 @@
           <a:p>
             <a:fld id="{1C8322F6-1C60-46CF-968C-BC20E470F443}" type="datetimeFigureOut">
               <a:rPr lang="en-US" smtClean="0"/>
-              <a:t>12/2/2024</a:t>
+              <a:t>12/3/2024</a:t>
             </a:fld>
             <a:endParaRPr lang="en-US"/>
           </a:p>
@@ -3257,7 +3283,7 @@
           <a:p>
             <a:fld id="{1C8322F6-1C60-46CF-968C-BC20E470F443}" type="datetimeFigureOut">
               <a:rPr lang="en-US" smtClean="0"/>
-              <a:t>12/2/2024</a:t>
+              <a:t>12/3/2024</a:t>
             </a:fld>
             <a:endParaRPr lang="en-US"/>
           </a:p>
@@ -3490,7 +3516,7 @@
           <a:p>
             <a:fld id="{1C8322F6-1C60-46CF-968C-BC20E470F443}" type="datetimeFigureOut">
               <a:rPr lang="en-US" smtClean="0"/>
-              <a:t>12/2/2024</a:t>
+              <a:t>12/3/2024</a:t>
             </a:fld>
             <a:endParaRPr lang="en-US"/>
           </a:p>
@@ -3689,7 +3715,7 @@
           <a:p>
             <a:fld id="{1C8322F6-1C60-46CF-968C-BC20E470F443}" type="datetimeFigureOut">
               <a:rPr lang="en-US" smtClean="0"/>
-              <a:t>12/2/2024</a:t>
+              <a:t>12/3/2024</a:t>
             </a:fld>
             <a:endParaRPr lang="en-US"/>
           </a:p>
@@ -4002,7 +4028,7 @@
           <a:p>
             <a:fld id="{1C8322F6-1C60-46CF-968C-BC20E470F443}" type="datetimeFigureOut">
               <a:rPr lang="en-US" smtClean="0"/>
-              <a:t>12/2/2024</a:t>
+              <a:t>12/3/2024</a:t>
             </a:fld>
             <a:endParaRPr lang="en-US"/>
           </a:p>
@@ -4466,7 +4492,7 @@
           <a:p>
             <a:fld id="{1C8322F6-1C60-46CF-968C-BC20E470F443}" type="datetimeFigureOut">
               <a:rPr lang="en-US" smtClean="0"/>
-              <a:t>12/2/2024</a:t>
+              <a:t>12/3/2024</a:t>
             </a:fld>
             <a:endParaRPr lang="en-US"/>
           </a:p>
@@ -4879,7 +4905,7 @@
           <a:p>
             <a:fld id="{1C8322F6-1C60-46CF-968C-BC20E470F443}" type="datetimeFigureOut">
               <a:rPr lang="en-US" smtClean="0"/>
-              <a:t>12/2/2024</a:t>
+              <a:t>12/3/2024</a:t>
             </a:fld>
             <a:endParaRPr lang="en-US"/>
           </a:p>
@@ -6349,10 +6375,10 @@
         </p:nvGrpSpPr>
         <p:grpSpPr>
           <a:xfrm>
-            <a:off x="8658728" y="563263"/>
-            <a:ext cx="3066725" cy="5735447"/>
-            <a:chOff x="4617591" y="519175"/>
-            <a:chExt cx="3066725" cy="5735447"/>
+            <a:off x="8658729" y="563263"/>
+            <a:ext cx="3066724" cy="5735447"/>
+            <a:chOff x="4617592" y="519175"/>
+            <a:chExt cx="3066724" cy="5735447"/>
           </a:xfrm>
         </p:grpSpPr>
         <p:sp>
@@ -6390,41 +6416,11 @@
                     <a:schemeClr val="bg1"/>
                   </a:solidFill>
                 </a:rPr>
-                <a:t>Linear Regression Model</a:t>
+                <a:t>Logistic Regression Model</a:t>
               </a:r>
             </a:p>
           </p:txBody>
         </p:sp>
-        <p:pic>
-          <p:nvPicPr>
-            <p:cNvPr id="31" name="Picture 30">
-              <a:extLst>
-                <a:ext uri="{FF2B5EF4-FFF2-40B4-BE49-F238E27FC236}">
-                  <a16:creationId xmlns:a16="http://schemas.microsoft.com/office/drawing/2014/main" id="{4103CAF1-B45A-AFBD-DF21-71D95CB77C0E}"/>
-                </a:ext>
-              </a:extLst>
-            </p:cNvPr>
-            <p:cNvPicPr>
-              <a:picLocks noChangeAspect="1"/>
-            </p:cNvPicPr>
-            <p:nvPr/>
-          </p:nvPicPr>
-          <p:blipFill>
-            <a:blip r:embed="rId6"/>
-            <a:stretch>
-              <a:fillRect/>
-            </a:stretch>
-          </p:blipFill>
-          <p:spPr>
-            <a:xfrm>
-              <a:off x="4617591" y="1304482"/>
-              <a:ext cx="3021297" cy="2931957"/>
-            </a:xfrm>
-            <a:prstGeom prst="rect">
-              <a:avLst/>
-            </a:prstGeom>
-          </p:spPr>
-        </p:pic>
         <p:pic>
           <p:nvPicPr>
             <p:cNvPr id="33" name="Picture 32">
@@ -6440,7 +6436,7 @@
             <p:nvPr/>
           </p:nvPicPr>
           <p:blipFill>
-            <a:blip r:embed="rId7"/>
+            <a:blip r:embed="rId6"/>
             <a:stretch>
               <a:fillRect/>
             </a:stretch>
@@ -6551,7 +6547,7 @@
               <p:nvPr/>
             </p:nvPicPr>
             <p:blipFill>
-              <a:blip r:embed="rId8"/>
+              <a:blip r:embed="rId7"/>
               <a:stretch>
                 <a:fillRect/>
               </a:stretch>
@@ -6582,7 +6578,7 @@
             <p:nvPr/>
           </p:nvPicPr>
           <p:blipFill>
-            <a:blip r:embed="rId9"/>
+            <a:blip r:embed="rId8"/>
             <a:stretch>
               <a:fillRect/>
             </a:stretch>
@@ -6598,6 +6594,36 @@
           </p:spPr>
         </p:pic>
       </p:grpSp>
+      <p:pic>
+        <p:nvPicPr>
+          <p:cNvPr id="6" name="Picture 5">
+            <a:extLst>
+              <a:ext uri="{FF2B5EF4-FFF2-40B4-BE49-F238E27FC236}">
+                <a16:creationId xmlns:a16="http://schemas.microsoft.com/office/drawing/2014/main" id="{9A603B3E-685A-F2E1-50A7-214CFE1FA767}"/>
+              </a:ext>
+            </a:extLst>
+          </p:cNvPr>
+          <p:cNvPicPr>
+            <a:picLocks noChangeAspect="1"/>
+          </p:cNvPicPr>
+          <p:nvPr/>
+        </p:nvPicPr>
+        <p:blipFill>
+          <a:blip r:embed="rId9"/>
+          <a:stretch>
+            <a:fillRect/>
+          </a:stretch>
+        </p:blipFill>
+        <p:spPr>
+          <a:xfrm>
+            <a:off x="8535723" y="1370367"/>
+            <a:ext cx="3311993" cy="2605201"/>
+          </a:xfrm>
+          <a:prstGeom prst="rect">
+            <a:avLst/>
+          </a:prstGeom>
+        </p:spPr>
+      </p:pic>
     </p:spTree>
     <p:extLst>
       <p:ext uri="{BB962C8B-B14F-4D97-AF65-F5344CB8AC3E}">

</xml_diff>